<commit_message>
[WT A ] modifica bozza
</commit_message>
<xml_diff>
--- a/Presentazione/Atsilo1/Bottiglieri/Atsilo_A_GianfrancoB.pptx
+++ b/Presentazione/Atsilo1/Bottiglieri/Atsilo_A_GianfrancoB.pptx
@@ -369,7 +369,7 @@
     </p:spTree>
     <p:extLst>
       <p:ext uri="{BB962C8B-B14F-4D97-AF65-F5344CB8AC3E}">
-        <p14:creationId xmlns:p14="http://schemas.microsoft.com/office/powerpoint/2010/main" xmlns="" val="2126419590"/>
+        <p14:creationId xmlns="" xmlns:p14="http://schemas.microsoft.com/office/powerpoint/2010/main" val="2126419590"/>
       </p:ext>
     </p:extLst>
   </p:cSld>
@@ -4413,6 +4413,8 @@
                 <a:spcPct val="100000"/>
               </a:lnSpc>
               <a:buSzPct val="95000"/>
+              <a:buFont typeface="Wingdings" pitchFamily="2" charset="2"/>
+              <a:buChar char="v"/>
             </a:pPr>
             <a:r>
               <a:rPr lang="it-IT" sz="4000" b="1" dirty="0" err="1">
@@ -4424,25 +4426,53 @@
               <a:t>NotificheMail</a:t>
             </a:r>
             <a:r>
-              <a:rPr lang="it-IT" sz="4000" b="1" dirty="0">
+              <a:rPr lang="it-IT" sz="4000" b="1" dirty="0" smtClean="0">
                 <a:solidFill>
                   <a:srgbClr val="000000"/>
                 </a:solidFill>
                 <a:latin typeface="Calibri"/>
               </a:rPr>
-              <a:t>: </a:t>
-            </a:r>
-            <a:r>
-              <a:rPr lang="it-IT" sz="4000" dirty="0">
+              <a:t>:</a:t>
+            </a:r>
+          </a:p>
+          <a:p>
+            <a:pPr>
+              <a:lnSpc>
+                <a:spcPct val="100000"/>
+              </a:lnSpc>
+              <a:buSzPct val="95000"/>
+            </a:pPr>
+            <a:endParaRPr lang="it-IT" sz="4000" b="1" dirty="0" smtClean="0">
+              <a:solidFill>
+                <a:srgbClr val="000000"/>
+              </a:solidFill>
+              <a:latin typeface="Calibri"/>
+            </a:endParaRPr>
+          </a:p>
+          <a:p>
+            <a:pPr lvl="1">
+              <a:buSzPct val="95000"/>
+            </a:pPr>
+            <a:r>
+              <a:rPr lang="it-IT" sz="2800" dirty="0" smtClean="0">
                 <a:solidFill>
                   <a:srgbClr val="000000"/>
                 </a:solidFill>
                 <a:latin typeface="Calibri"/>
               </a:rPr>
-              <a:t>è una funzionalità interna al nostro </a:t>
-            </a:r>
-            <a:r>
-              <a:rPr lang="it-IT" sz="4000" dirty="0" smtClean="0">
+              <a:t>è </a:t>
+            </a:r>
+            <a:r>
+              <a:rPr lang="it-IT" sz="2800" dirty="0">
+                <a:solidFill>
+                  <a:srgbClr val="000000"/>
+                </a:solidFill>
+                <a:latin typeface="Calibri"/>
+              </a:rPr>
+              <a:t>una funzionalità interna al nostro </a:t>
+            </a:r>
+            <a:r>
+              <a:rPr lang="it-IT" sz="2800" dirty="0" smtClean="0">
                 <a:solidFill>
                   <a:srgbClr val="000000"/>
                 </a:solidFill>
@@ -4451,7 +4481,7 @@
               <a:t>sistema </a:t>
             </a:r>
             <a:r>
-              <a:rPr lang="it-IT" sz="4000" dirty="0">
+              <a:rPr lang="it-IT" sz="2800" dirty="0">
                 <a:solidFill>
                   <a:srgbClr val="000000"/>
                 </a:solidFill>
@@ -4592,8 +4622,8 @@
                 <a:spcPct val="100000"/>
               </a:lnSpc>
               <a:buSzPct val="95000"/>
-              <a:buFont typeface="Arial"/>
-              <a:buChar char="•"/>
+              <a:buFont typeface="Wingdings" pitchFamily="2" charset="2"/>
+              <a:buChar char="v"/>
             </a:pPr>
             <a:r>
               <a:rPr lang="it-IT" sz="3200" dirty="0">
@@ -4616,10 +4646,7 @@
             <a:endParaRPr sz="2000"/>
           </a:p>
           <a:p>
-            <a:pPr>
-              <a:lnSpc>
-                <a:spcPct val="100000"/>
-              </a:lnSpc>
+            <a:pPr lvl="1">
               <a:buSzPct val="95000"/>
               <a:buFont typeface="Arial"/>
               <a:buChar char="•"/>
@@ -4640,15 +4667,39 @@
                 </a:solidFill>
                 <a:latin typeface="Calibri"/>
               </a:rPr>
-              <a:t>, manda una notifica al responsabile delle classi, con un link in cui quest'ultimo l'approverà.</a:t>
+              <a:t>, manda una notifica al responsabile delle </a:t>
+            </a:r>
+            <a:r>
+              <a:rPr lang="it-IT" sz="3200" dirty="0" smtClean="0">
+                <a:solidFill>
+                  <a:srgbClr val="000000"/>
+                </a:solidFill>
+                <a:latin typeface="Calibri"/>
+              </a:rPr>
+              <a:t>classi,che </a:t>
+            </a:r>
+            <a:r>
+              <a:rPr lang="it-IT" sz="3200" dirty="0">
+                <a:solidFill>
+                  <a:srgbClr val="000000"/>
+                </a:solidFill>
+                <a:latin typeface="Calibri"/>
+              </a:rPr>
+              <a:t>quest'ultimo </a:t>
+            </a:r>
+            <a:r>
+              <a:rPr lang="it-IT" sz="3200" dirty="0" smtClean="0">
+                <a:solidFill>
+                  <a:srgbClr val="000000"/>
+                </a:solidFill>
+                <a:latin typeface="Calibri"/>
+              </a:rPr>
+              <a:t>dovrà poi approvare.</a:t>
             </a:r>
             <a:endParaRPr sz="2000"/>
           </a:p>
           <a:p>
-            <a:pPr>
-              <a:lnSpc>
-                <a:spcPct val="100000"/>
-              </a:lnSpc>
+            <a:pPr lvl="1">
               <a:buSzPct val="95000"/>
               <a:buFont typeface="Arial"/>
               <a:buChar char="•"/>
@@ -4692,10 +4743,7 @@
             <a:endParaRPr sz="2000"/>
           </a:p>
           <a:p>
-            <a:pPr>
-              <a:lnSpc>
-                <a:spcPct val="100000"/>
-              </a:lnSpc>
+            <a:pPr lvl="1">
               <a:buSzPct val="95000"/>
               <a:buFont typeface="Arial"/>
               <a:buChar char="•"/>
@@ -4846,7 +4894,7 @@
               <a:buChar char="•"/>
             </a:pPr>
             <a:r>
-              <a:rPr lang="it-IT" sz="4400" b="1" dirty="0">
+              <a:rPr lang="it-IT" sz="3200" b="1" dirty="0">
                 <a:solidFill>
                   <a:srgbClr val="000000"/>
                 </a:solidFill>
@@ -4855,7 +4903,7 @@
               <a:t>Licenziamento,</a:t>
             </a:r>
             <a:r>
-              <a:rPr lang="it-IT" sz="4400" dirty="0">
+              <a:rPr lang="it-IT" sz="3200" dirty="0">
                 <a:solidFill>
                   <a:srgbClr val="000000"/>
                 </a:solidFill>
@@ -4864,7 +4912,7 @@
               <a:t>manda una notifica al diretto interessato</a:t>
             </a:r>
             <a:r>
-              <a:rPr lang="it-IT" sz="4400" b="1" dirty="0">
+              <a:rPr lang="it-IT" sz="3200" b="1" dirty="0">
                 <a:solidFill>
                   <a:srgbClr val="000000"/>
                 </a:solidFill>
@@ -4884,7 +4932,7 @@
               <a:buChar char="•"/>
             </a:pPr>
             <a:r>
-              <a:rPr lang="it-IT" sz="4400" b="1" dirty="0">
+              <a:rPr lang="it-IT" sz="3200" b="1" dirty="0">
                 <a:solidFill>
                   <a:srgbClr val="000000"/>
                 </a:solidFill>
@@ -4893,7 +4941,7 @@
               <a:t>Registrazione,</a:t>
             </a:r>
             <a:r>
-              <a:rPr lang="it-IT" sz="4400" dirty="0">
+              <a:rPr lang="it-IT" sz="3200" dirty="0">
                 <a:solidFill>
                   <a:srgbClr val="000000"/>
                 </a:solidFill>
@@ -4901,7 +4949,7 @@
               </a:rPr>
               <a:t>alla fine della registrazione il sistema invia un </a:t>
             </a:r>
-            <a:endParaRPr lang="it-IT" sz="4400" dirty="0" smtClean="0">
+            <a:endParaRPr lang="it-IT" sz="3200" dirty="0" smtClean="0">
               <a:solidFill>
                 <a:srgbClr val="000000"/>
               </a:solidFill>
@@ -4916,7 +4964,7 @@
               <a:buSzPct val="95000"/>
             </a:pPr>
             <a:r>
-              <a:rPr lang="it-IT" sz="4400" dirty="0" smtClean="0">
+              <a:rPr lang="it-IT" sz="3200" dirty="0" smtClean="0">
                 <a:solidFill>
                   <a:srgbClr val="000000"/>
                 </a:solidFill>
@@ -4925,7 +4973,7 @@
               <a:t>e-mail </a:t>
             </a:r>
             <a:r>
-              <a:rPr lang="it-IT" sz="4400" dirty="0">
+              <a:rPr lang="it-IT" sz="3200" dirty="0">
                 <a:solidFill>
                   <a:srgbClr val="000000"/>
                 </a:solidFill>
@@ -4934,7 +4982,7 @@
               <a:t>con le credenziali appena inserite</a:t>
             </a:r>
             <a:r>
-              <a:rPr lang="it-IT" sz="4400" b="1" dirty="0">
+              <a:rPr lang="it-IT" sz="3200" b="1" dirty="0">
                 <a:solidFill>
                   <a:srgbClr val="000000"/>
                 </a:solidFill>
@@ -5138,18 +5186,77 @@
                 <a:spcPct val="100000"/>
               </a:lnSpc>
               <a:buSzPct val="95000"/>
+              <a:buFont typeface="Wingdings" pitchFamily="2" charset="2"/>
+              <a:buChar char="v"/>
             </a:pPr>
             <a:r>
-              <a:rPr lang="it-IT" sz="4400" dirty="0">
+              <a:rPr lang="it-IT" sz="4400" b="1" dirty="0" smtClean="0">
                 <a:solidFill>
                   <a:srgbClr val="000000"/>
                 </a:solidFill>
                 <a:latin typeface="Calibri"/>
               </a:rPr>
-              <a:t>Per dar vita a questa funzionalità abbiamo usato </a:t>
-            </a:r>
-            <a:r>
-              <a:rPr lang="it-IT" sz="4400" b="1" dirty="0" smtClean="0">
+              <a:t>Come fare?</a:t>
+            </a:r>
+          </a:p>
+          <a:p>
+            <a:pPr>
+              <a:lnSpc>
+                <a:spcPct val="100000"/>
+              </a:lnSpc>
+              <a:buSzPct val="95000"/>
+            </a:pPr>
+            <a:endParaRPr lang="it-IT" sz="4400" b="1" dirty="0" smtClean="0">
+              <a:solidFill>
+                <a:srgbClr val="000000"/>
+              </a:solidFill>
+              <a:latin typeface="Calibri"/>
+            </a:endParaRPr>
+          </a:p>
+          <a:p>
+            <a:pPr lvl="1">
+              <a:buSzPct val="95000"/>
+              <a:buFont typeface="Arial" pitchFamily="34" charset="0"/>
+              <a:buChar char="•"/>
+            </a:pPr>
+            <a:r>
+              <a:rPr lang="it-IT" sz="3200" dirty="0" smtClean="0">
+                <a:solidFill>
+                  <a:srgbClr val="000000"/>
+                </a:solidFill>
+                <a:latin typeface="Calibri"/>
+              </a:rPr>
+              <a:t>Per </a:t>
+            </a:r>
+            <a:r>
+              <a:rPr lang="it-IT" sz="3200" dirty="0">
+                <a:solidFill>
+                  <a:srgbClr val="000000"/>
+                </a:solidFill>
+                <a:latin typeface="Calibri"/>
+              </a:rPr>
+              <a:t>dar vita a questa funzionalità </a:t>
+            </a:r>
+            <a:r>
+              <a:rPr lang="it-IT" sz="3200" dirty="0" smtClean="0">
+                <a:solidFill>
+                  <a:srgbClr val="000000"/>
+                </a:solidFill>
+                <a:latin typeface="Calibri"/>
+              </a:rPr>
+              <a:t>abbiamo </a:t>
+            </a:r>
+            <a:r>
+              <a:rPr lang="it-IT" sz="3200" dirty="0">
+                <a:solidFill>
+                  <a:srgbClr val="000000"/>
+                </a:solidFill>
+                <a:latin typeface="Calibri"/>
+              </a:rPr>
+              <a:t>usato </a:t>
+            </a:r>
+            <a:r>
+              <a:rPr lang="it-IT" sz="3200" b="1" dirty="0" smtClean="0">
                 <a:solidFill>
                   <a:srgbClr val="000000"/>
                 </a:solidFill>
@@ -5158,16 +5265,34 @@
               <a:t>JAVAMAIL  (</a:t>
             </a:r>
             <a:r>
-              <a:rPr lang="it-IT" sz="4400" b="1" dirty="0">
+              <a:rPr lang="it-IT" sz="3200" b="1" dirty="0">
                 <a:solidFill>
                   <a:srgbClr val="000000"/>
                 </a:solidFill>
                 <a:latin typeface="Calibri"/>
               </a:rPr>
-              <a:t>è un api della </a:t>
-            </a:r>
-            <a:r>
-              <a:rPr lang="it-IT" sz="4400" b="1" dirty="0" err="1">
+              <a:t>è </a:t>
+            </a:r>
+            <a:r>
+              <a:rPr lang="it-IT" sz="3200" b="1" dirty="0" smtClean="0">
+                <a:solidFill>
+                  <a:srgbClr val="000000"/>
+                </a:solidFill>
+                <a:latin typeface="Calibri"/>
+              </a:rPr>
+              <a:t>un </a:t>
+            </a:r>
+            <a:r>
+              <a:rPr lang="it-IT" sz="3200" b="1" dirty="0">
+                <a:solidFill>
+                  <a:srgbClr val="000000"/>
+                </a:solidFill>
+                <a:latin typeface="Calibri"/>
+              </a:rPr>
+              <a:t>api della </a:t>
+            </a:r>
+            <a:r>
+              <a:rPr lang="it-IT" sz="3200" b="1" dirty="0" err="1">
                 <a:solidFill>
                   <a:srgbClr val="000000"/>
                 </a:solidFill>
@@ -5176,7 +5301,7 @@
               <a:t>Sun</a:t>
             </a:r>
             <a:r>
-              <a:rPr lang="it-IT" sz="4400" b="1" dirty="0">
+              <a:rPr lang="it-IT" sz="3200" b="1" dirty="0">
                 <a:solidFill>
                   <a:srgbClr val="000000"/>
                 </a:solidFill>
@@ -5185,15 +5310,51 @@
               <a:t>) </a:t>
             </a:r>
             <a:r>
-              <a:rPr lang="it-IT" sz="4400" dirty="0">
+              <a:rPr lang="it-IT" sz="3200" dirty="0">
                 <a:solidFill>
                   <a:srgbClr val="000000"/>
                 </a:solidFill>
                 <a:latin typeface="Calibri"/>
               </a:rPr>
-              <a:t>e l'abbiamo integrata nel nostro sistema tramite il design pattern BRIDGE.</a:t>
-            </a:r>
-            <a:endParaRPr sz="3200"/>
+              <a:t>e l'abbiamo </a:t>
+            </a:r>
+            <a:r>
+              <a:rPr lang="it-IT" sz="3200" dirty="0" smtClean="0">
+                <a:solidFill>
+                  <a:srgbClr val="000000"/>
+                </a:solidFill>
+                <a:latin typeface="Calibri"/>
+              </a:rPr>
+              <a:t>integrata </a:t>
+            </a:r>
+            <a:r>
+              <a:rPr lang="it-IT" sz="3200" dirty="0">
+                <a:solidFill>
+                  <a:srgbClr val="000000"/>
+                </a:solidFill>
+                <a:latin typeface="Calibri"/>
+              </a:rPr>
+              <a:t>nel nostro sistema </a:t>
+            </a:r>
+            <a:r>
+              <a:rPr lang="it-IT" sz="3200" dirty="0" smtClean="0">
+                <a:solidFill>
+                  <a:srgbClr val="000000"/>
+                </a:solidFill>
+                <a:latin typeface="Calibri"/>
+              </a:rPr>
+              <a:t>tramite </a:t>
+            </a:r>
+            <a:r>
+              <a:rPr lang="it-IT" sz="3200" dirty="0">
+                <a:solidFill>
+                  <a:srgbClr val="000000"/>
+                </a:solidFill>
+                <a:latin typeface="Calibri"/>
+              </a:rPr>
+              <a:t>il design pattern BRIDGE.</a:t>
+            </a:r>
+            <a:endParaRPr sz="2000"/>
           </a:p>
         </p:txBody>
       </p:sp>
@@ -6007,11 +6168,7 @@
           <a:p>
             <a:r>
               <a:rPr lang="it-IT" dirty="0" smtClean="0"/>
-              <a:t>t</a:t>
-            </a:r>
-            <a:r>
-              <a:rPr lang="it-IT" dirty="0" smtClean="0"/>
-              <a:t>ipi di messaggi sopra citati ovvero : </a:t>
+              <a:t>tipi di messaggi sopra citati ovvero : </a:t>
             </a:r>
             <a:r>
               <a:rPr lang="it-IT" dirty="0" err="1" smtClean="0"/>
@@ -6151,32 +6308,39 @@
                 <a:spcPct val="100000"/>
               </a:lnSpc>
               <a:buSzPct val="95000"/>
+              <a:buFont typeface="Wingdings" pitchFamily="2" charset="2"/>
+              <a:buChar char="v"/>
             </a:pPr>
             <a:r>
-              <a:rPr lang="it-IT" sz="3200" dirty="0" smtClean="0"/>
-              <a:t>Abbiamo scelto di integrare </a:t>
-            </a:r>
-            <a:r>
               <a:rPr lang="it-IT" sz="3200" b="1" dirty="0" err="1" smtClean="0"/>
-              <a:t>JavaMail</a:t>
-            </a:r>
-            <a:r>
-              <a:rPr lang="it-IT" sz="3200" b="1" dirty="0" smtClean="0"/>
-              <a:t> </a:t>
-            </a:r>
-            <a:r>
-              <a:rPr lang="it-IT" sz="3200" dirty="0" smtClean="0"/>
-              <a:t>con il pattern bridge, perché soprattutto ci permette di inserire altri messaggi in modo semplice  e senza causare molti cambiamenti nel sistema cosi come modificare </a:t>
-            </a:r>
-            <a:r>
-              <a:rPr lang="it-IT" sz="3200" smtClean="0"/>
-              <a:t>quelli già esistenti</a:t>
-            </a:r>
-            <a:r>
-              <a:rPr lang="it-IT" sz="3200" dirty="0" smtClean="0"/>
-              <a:t>.</a:t>
-            </a:r>
-            <a:endParaRPr sz="3200" b="1"/>
+              <a:t>Perchè</a:t>
+            </a:r>
+            <a:endParaRPr lang="it-IT" sz="3200" b="1" dirty="0" smtClean="0"/>
+          </a:p>
+          <a:p>
+            <a:pPr>
+              <a:lnSpc>
+                <a:spcPct val="100000"/>
+              </a:lnSpc>
+              <a:buSzPct val="95000"/>
+            </a:pPr>
+            <a:endParaRPr lang="it-IT" sz="3200" dirty="0" smtClean="0"/>
+          </a:p>
+          <a:p>
+            <a:pPr lvl="1">
+              <a:buSzPct val="95000"/>
+              <a:buFont typeface="Arial" pitchFamily="34" charset="0"/>
+              <a:buChar char="•"/>
+            </a:pPr>
+            <a:r>
+              <a:rPr lang="it-IT" sz="2800" smtClean="0"/>
+              <a:t>ci </a:t>
+            </a:r>
+            <a:r>
+              <a:rPr lang="it-IT" sz="2800" dirty="0" smtClean="0"/>
+              <a:t>permette di inserire altri messaggi in modo semplice  e senza causare molti cambiamenti nel sistema cosi come modificare quelli già esistenti.</a:t>
+            </a:r>
+            <a:endParaRPr sz="2800" b="1"/>
           </a:p>
         </p:txBody>
       </p:sp>

</xml_diff>

<commit_message>
[WR A] Presentazione finale, parti complete: BARBA, MICCO e BOTTIGLIERI.
</commit_message>
<xml_diff>
--- a/Presentazione/Atsilo1/Bottiglieri/Atsilo_A_GianfrancoB.pptx
+++ b/Presentazione/Atsilo1/Bottiglieri/Atsilo_A_GianfrancoB.pptx
@@ -201,7 +201,7 @@
             <a:fld id="{38D78F4D-402C-46E0-A4BB-DF91EA86B14C}" type="datetimeFigureOut">
               <a:rPr lang="it-IT" smtClean="0"/>
               <a:pPr/>
-              <a:t>29/12/2012</a:t>
+              <a:t>30/12/12</a:t>
             </a:fld>
             <a:endParaRPr lang="it-IT"/>
           </a:p>
@@ -361,7 +361,7 @@
             <a:fld id="{D70604CA-7593-4640-8FA1-5523937B8510}" type="slidenum">
               <a:rPr lang="it-IT" smtClean="0"/>
               <a:pPr/>
-              <a:t>‹N›</a:t>
+              <a:t>‹n.›</a:t>
             </a:fld>
             <a:endParaRPr lang="it-IT"/>
           </a:p>
@@ -370,7 +370,7 @@
     </p:spTree>
     <p:extLst>
       <p:ext uri="{BB962C8B-B14F-4D97-AF65-F5344CB8AC3E}">
-        <p14:creationId xmlns:p14="http://schemas.microsoft.com/office/powerpoint/2010/main" xmlns="" val="2126419590"/>
+        <p14:creationId xmlns:p14="http://schemas.microsoft.com/office/powerpoint/2010/main" val="2126419590"/>
       </p:ext>
     </p:extLst>
   </p:cSld>
@@ -636,7 +636,7 @@
             <a:fld id="{63CABBC0-75E4-43BB-A6A6-84C2A96BDB82}" type="datetimeFigureOut">
               <a:rPr lang="it-IT" smtClean="0"/>
               <a:pPr/>
-              <a:t>29/12/2012</a:t>
+              <a:t>30/12/12</a:t>
             </a:fld>
             <a:endParaRPr lang="it-IT"/>
           </a:p>
@@ -679,7 +679,7 @@
             <a:fld id="{F89AEA99-3E91-4C58-9AD4-045DB5619AC3}" type="slidenum">
               <a:rPr lang="it-IT" smtClean="0"/>
               <a:pPr/>
-              <a:t>‹N›</a:t>
+              <a:t>‹n.›</a:t>
             </a:fld>
             <a:endParaRPr lang="it-IT"/>
           </a:p>
@@ -693,7 +693,7 @@
   <p:timing>
     <p:tnLst>
       <p:par>
-        <p:cTn id="1" dur="indefinite" restart="never" nodeType="tmRoot"/>
+        <p:cTn xmlns:p14="http://schemas.microsoft.com/office/powerpoint/2010/main" id="1" dur="indefinite" restart="never" nodeType="tmRoot"/>
       </p:par>
     </p:tnLst>
   </p:timing>
@@ -818,7 +818,7 @@
             <a:fld id="{63CABBC0-75E4-43BB-A6A6-84C2A96BDB82}" type="datetimeFigureOut">
               <a:rPr lang="it-IT" smtClean="0"/>
               <a:pPr/>
-              <a:t>29/12/2012</a:t>
+              <a:t>30/12/12</a:t>
             </a:fld>
             <a:endParaRPr lang="it-IT"/>
           </a:p>
@@ -861,7 +861,7 @@
             <a:fld id="{F89AEA99-3E91-4C58-9AD4-045DB5619AC3}" type="slidenum">
               <a:rPr lang="it-IT" smtClean="0"/>
               <a:pPr/>
-              <a:t>‹N›</a:t>
+              <a:t>‹n.›</a:t>
             </a:fld>
             <a:endParaRPr lang="it-IT"/>
           </a:p>
@@ -875,7 +875,7 @@
   <p:timing>
     <p:tnLst>
       <p:par>
-        <p:cTn id="1" dur="indefinite" restart="never" nodeType="tmRoot"/>
+        <p:cTn xmlns:p14="http://schemas.microsoft.com/office/powerpoint/2010/main" id="1" dur="indefinite" restart="never" nodeType="tmRoot"/>
       </p:par>
     </p:tnLst>
   </p:timing>
@@ -1010,7 +1010,7 @@
             <a:fld id="{63CABBC0-75E4-43BB-A6A6-84C2A96BDB82}" type="datetimeFigureOut">
               <a:rPr lang="it-IT" smtClean="0"/>
               <a:pPr/>
-              <a:t>29/12/2012</a:t>
+              <a:t>30/12/12</a:t>
             </a:fld>
             <a:endParaRPr lang="it-IT"/>
           </a:p>
@@ -1053,7 +1053,7 @@
             <a:fld id="{F89AEA99-3E91-4C58-9AD4-045DB5619AC3}" type="slidenum">
               <a:rPr lang="it-IT" smtClean="0"/>
               <a:pPr/>
-              <a:t>‹N›</a:t>
+              <a:t>‹n.›</a:t>
             </a:fld>
             <a:endParaRPr lang="it-IT"/>
           </a:p>
@@ -1067,7 +1067,7 @@
   <p:timing>
     <p:tnLst>
       <p:par>
-        <p:cTn id="1" dur="indefinite" restart="never" nodeType="tmRoot"/>
+        <p:cTn xmlns:p14="http://schemas.microsoft.com/office/powerpoint/2010/main" id="1" dur="indefinite" restart="never" nodeType="tmRoot"/>
       </p:par>
     </p:tnLst>
   </p:timing>
@@ -1192,7 +1192,7 @@
             <a:fld id="{63CABBC0-75E4-43BB-A6A6-84C2A96BDB82}" type="datetimeFigureOut">
               <a:rPr lang="it-IT" smtClean="0"/>
               <a:pPr/>
-              <a:t>29/12/2012</a:t>
+              <a:t>30/12/12</a:t>
             </a:fld>
             <a:endParaRPr lang="it-IT"/>
           </a:p>
@@ -1235,7 +1235,7 @@
             <a:fld id="{F89AEA99-3E91-4C58-9AD4-045DB5619AC3}" type="slidenum">
               <a:rPr lang="it-IT" smtClean="0"/>
               <a:pPr/>
-              <a:t>‹N›</a:t>
+              <a:t>‹n.›</a:t>
             </a:fld>
             <a:endParaRPr lang="it-IT"/>
           </a:p>
@@ -1249,7 +1249,7 @@
   <p:timing>
     <p:tnLst>
       <p:par>
-        <p:cTn id="1" dur="indefinite" restart="never" nodeType="tmRoot"/>
+        <p:cTn xmlns:p14="http://schemas.microsoft.com/office/powerpoint/2010/main" id="1" dur="indefinite" restart="never" nodeType="tmRoot"/>
       </p:par>
     </p:tnLst>
   </p:timing>
@@ -1435,7 +1435,7 @@
             <a:fld id="{63CABBC0-75E4-43BB-A6A6-84C2A96BDB82}" type="datetimeFigureOut">
               <a:rPr lang="it-IT" smtClean="0"/>
               <a:pPr/>
-              <a:t>29/12/2012</a:t>
+              <a:t>30/12/12</a:t>
             </a:fld>
             <a:endParaRPr lang="it-IT"/>
           </a:p>
@@ -1478,7 +1478,7 @@
             <a:fld id="{F89AEA99-3E91-4C58-9AD4-045DB5619AC3}" type="slidenum">
               <a:rPr lang="it-IT" smtClean="0"/>
               <a:pPr/>
-              <a:t>‹N›</a:t>
+              <a:t>‹n.›</a:t>
             </a:fld>
             <a:endParaRPr lang="it-IT"/>
           </a:p>
@@ -1492,7 +1492,7 @@
   <p:timing>
     <p:tnLst>
       <p:par>
-        <p:cTn id="1" dur="indefinite" restart="never" nodeType="tmRoot"/>
+        <p:cTn xmlns:p14="http://schemas.microsoft.com/office/powerpoint/2010/main" id="1" dur="indefinite" restart="never" nodeType="tmRoot"/>
       </p:par>
     </p:tnLst>
   </p:timing>
@@ -1716,7 +1716,7 @@
             <a:fld id="{63CABBC0-75E4-43BB-A6A6-84C2A96BDB82}" type="datetimeFigureOut">
               <a:rPr lang="it-IT" smtClean="0"/>
               <a:pPr/>
-              <a:t>29/12/2012</a:t>
+              <a:t>30/12/12</a:t>
             </a:fld>
             <a:endParaRPr lang="it-IT"/>
           </a:p>
@@ -1759,7 +1759,7 @@
             <a:fld id="{F89AEA99-3E91-4C58-9AD4-045DB5619AC3}" type="slidenum">
               <a:rPr lang="it-IT" smtClean="0"/>
               <a:pPr/>
-              <a:t>‹N›</a:t>
+              <a:t>‹n.›</a:t>
             </a:fld>
             <a:endParaRPr lang="it-IT"/>
           </a:p>
@@ -1773,7 +1773,7 @@
   <p:timing>
     <p:tnLst>
       <p:par>
-        <p:cTn id="1" dur="indefinite" restart="never" nodeType="tmRoot"/>
+        <p:cTn xmlns:p14="http://schemas.microsoft.com/office/powerpoint/2010/main" id="1" dur="indefinite" restart="never" nodeType="tmRoot"/>
       </p:par>
     </p:tnLst>
   </p:timing>
@@ -2107,7 +2107,7 @@
             <a:fld id="{63CABBC0-75E4-43BB-A6A6-84C2A96BDB82}" type="datetimeFigureOut">
               <a:rPr lang="it-IT" smtClean="0"/>
               <a:pPr/>
-              <a:t>29/12/2012</a:t>
+              <a:t>30/12/12</a:t>
             </a:fld>
             <a:endParaRPr lang="it-IT"/>
           </a:p>
@@ -2150,7 +2150,7 @@
             <a:fld id="{F89AEA99-3E91-4C58-9AD4-045DB5619AC3}" type="slidenum">
               <a:rPr lang="it-IT" smtClean="0"/>
               <a:pPr/>
-              <a:t>‹N›</a:t>
+              <a:t>‹n.›</a:t>
             </a:fld>
             <a:endParaRPr lang="it-IT"/>
           </a:p>
@@ -2164,7 +2164,7 @@
   <p:timing>
     <p:tnLst>
       <p:par>
-        <p:cTn id="1" dur="indefinite" restart="never" nodeType="tmRoot"/>
+        <p:cTn xmlns:p14="http://schemas.microsoft.com/office/powerpoint/2010/main" id="1" dur="indefinite" restart="never" nodeType="tmRoot"/>
       </p:par>
     </p:tnLst>
   </p:timing>
@@ -2266,7 +2266,7 @@
             <a:fld id="{63CABBC0-75E4-43BB-A6A6-84C2A96BDB82}" type="datetimeFigureOut">
               <a:rPr lang="it-IT" smtClean="0"/>
               <a:pPr/>
-              <a:t>29/12/2012</a:t>
+              <a:t>30/12/12</a:t>
             </a:fld>
             <a:endParaRPr lang="it-IT"/>
           </a:p>
@@ -2309,7 +2309,7 @@
             <a:fld id="{F89AEA99-3E91-4C58-9AD4-045DB5619AC3}" type="slidenum">
               <a:rPr lang="it-IT" smtClean="0"/>
               <a:pPr/>
-              <a:t>‹N›</a:t>
+              <a:t>‹n.›</a:t>
             </a:fld>
             <a:endParaRPr lang="it-IT"/>
           </a:p>
@@ -2323,7 +2323,7 @@
   <p:timing>
     <p:tnLst>
       <p:par>
-        <p:cTn id="1" dur="indefinite" restart="never" nodeType="tmRoot"/>
+        <p:cTn xmlns:p14="http://schemas.microsoft.com/office/powerpoint/2010/main" id="1" dur="indefinite" restart="never" nodeType="tmRoot"/>
       </p:par>
     </p:tnLst>
   </p:timing>
@@ -2365,7 +2365,7 @@
             <a:fld id="{63CABBC0-75E4-43BB-A6A6-84C2A96BDB82}" type="datetimeFigureOut">
               <a:rPr lang="it-IT" smtClean="0"/>
               <a:pPr/>
-              <a:t>29/12/2012</a:t>
+              <a:t>30/12/12</a:t>
             </a:fld>
             <a:endParaRPr lang="it-IT"/>
           </a:p>
@@ -2408,7 +2408,7 @@
             <a:fld id="{F89AEA99-3E91-4C58-9AD4-045DB5619AC3}" type="slidenum">
               <a:rPr lang="it-IT" smtClean="0"/>
               <a:pPr/>
-              <a:t>‹N›</a:t>
+              <a:t>‹n.›</a:t>
             </a:fld>
             <a:endParaRPr lang="it-IT"/>
           </a:p>
@@ -2422,7 +2422,7 @@
   <p:timing>
     <p:tnLst>
       <p:par>
-        <p:cTn id="1" dur="indefinite" restart="never" nodeType="tmRoot"/>
+        <p:cTn xmlns:p14="http://schemas.microsoft.com/office/powerpoint/2010/main" id="1" dur="indefinite" restart="never" nodeType="tmRoot"/>
       </p:par>
     </p:tnLst>
   </p:timing>
@@ -2635,7 +2635,7 @@
             <a:fld id="{63CABBC0-75E4-43BB-A6A6-84C2A96BDB82}" type="datetimeFigureOut">
               <a:rPr lang="it-IT" smtClean="0"/>
               <a:pPr/>
-              <a:t>29/12/2012</a:t>
+              <a:t>30/12/12</a:t>
             </a:fld>
             <a:endParaRPr lang="it-IT"/>
           </a:p>
@@ -2678,7 +2678,7 @@
             <a:fld id="{F89AEA99-3E91-4C58-9AD4-045DB5619AC3}" type="slidenum">
               <a:rPr lang="it-IT" smtClean="0"/>
               <a:pPr/>
-              <a:t>‹N›</a:t>
+              <a:t>‹n.›</a:t>
             </a:fld>
             <a:endParaRPr lang="it-IT"/>
           </a:p>
@@ -2692,7 +2692,7 @@
   <p:timing>
     <p:tnLst>
       <p:par>
-        <p:cTn id="1" dur="indefinite" restart="never" nodeType="tmRoot"/>
+        <p:cTn xmlns:p14="http://schemas.microsoft.com/office/powerpoint/2010/main" id="1" dur="indefinite" restart="never" nodeType="tmRoot"/>
       </p:par>
     </p:tnLst>
   </p:timing>
@@ -2932,7 +2932,7 @@
             <a:fld id="{63CABBC0-75E4-43BB-A6A6-84C2A96BDB82}" type="datetimeFigureOut">
               <a:rPr lang="it-IT" smtClean="0"/>
               <a:pPr/>
-              <a:t>29/12/2012</a:t>
+              <a:t>30/12/12</a:t>
             </a:fld>
             <a:endParaRPr lang="it-IT"/>
           </a:p>
@@ -2980,7 +2980,7 @@
             <a:fld id="{F89AEA99-3E91-4C58-9AD4-045DB5619AC3}" type="slidenum">
               <a:rPr lang="it-IT" smtClean="0"/>
               <a:pPr/>
-              <a:t>‹N›</a:t>
+              <a:t>‹n.›</a:t>
             </a:fld>
             <a:endParaRPr lang="it-IT"/>
           </a:p>
@@ -3296,7 +3296,7 @@
   <p:timing>
     <p:tnLst>
       <p:par>
-        <p:cTn id="1" dur="indefinite" restart="never" nodeType="tmRoot"/>
+        <p:cTn xmlns:p14="http://schemas.microsoft.com/office/powerpoint/2010/main" id="1" dur="indefinite" restart="never" nodeType="tmRoot"/>
       </p:par>
     </p:tnLst>
   </p:timing>
@@ -3712,7 +3712,7 @@
             <a:fld id="{63CABBC0-75E4-43BB-A6A6-84C2A96BDB82}" type="datetimeFigureOut">
               <a:rPr lang="it-IT" smtClean="0"/>
               <a:pPr/>
-              <a:t>29/12/2012</a:t>
+              <a:t>30/12/12</a:t>
             </a:fld>
             <a:endParaRPr lang="it-IT"/>
           </a:p>
@@ -3791,7 +3791,7 @@
             <a:fld id="{F89AEA99-3E91-4C58-9AD4-045DB5619AC3}" type="slidenum">
               <a:rPr lang="it-IT" smtClean="0"/>
               <a:pPr/>
-              <a:t>‹N›</a:t>
+              <a:t>‹n.›</a:t>
             </a:fld>
             <a:endParaRPr lang="it-IT"/>
           </a:p>
@@ -4030,7 +4030,7 @@
   <p:timing>
     <p:tnLst>
       <p:par>
-        <p:cTn id="1" dur="indefinite" restart="never" nodeType="tmRoot"/>
+        <p:cTn xmlns:p14="http://schemas.microsoft.com/office/powerpoint/2010/main" id="1" dur="indefinite" restart="never" nodeType="tmRoot"/>
       </p:par>
     </p:tnLst>
   </p:timing>
@@ -4488,9 +4488,36 @@
                 </a:solidFill>
                 <a:latin typeface="Calibri"/>
               </a:rPr>
-              <a:t>che permette di inviare, brevi messaggi di notifiche agli utenti che porto a termine iterazioni con il nostro sistema:</a:t>
-            </a:r>
-            <a:endParaRPr sz="2800"/>
+              <a:t>che permette di </a:t>
+            </a:r>
+            <a:r>
+              <a:rPr lang="it-IT" sz="2800" dirty="0" smtClean="0">
+                <a:solidFill>
+                  <a:srgbClr val="000000"/>
+                </a:solidFill>
+                <a:latin typeface="Calibri"/>
+              </a:rPr>
+              <a:t>inviare </a:t>
+            </a:r>
+            <a:r>
+              <a:rPr lang="it-IT" sz="2800" dirty="0">
+                <a:solidFill>
+                  <a:srgbClr val="000000"/>
+                </a:solidFill>
+                <a:latin typeface="Calibri"/>
+              </a:rPr>
+              <a:t>brevi messaggi di notifiche agli utenti che porto a termine iterazioni con il nostro </a:t>
+            </a:r>
+            <a:r>
+              <a:rPr lang="it-IT" sz="2800" dirty="0" smtClean="0">
+                <a:solidFill>
+                  <a:srgbClr val="000000"/>
+                </a:solidFill>
+                <a:latin typeface="Calibri"/>
+              </a:rPr>
+              <a:t>sistema</a:t>
+            </a:r>
+            <a:endParaRPr sz="2800" dirty="0"/>
           </a:p>
         </p:txBody>
       </p:sp>
@@ -4502,7 +4529,7 @@
   <p:timing>
     <p:tnLst>
       <p:par>
-        <p:cTn id="1" dur="indefinite" restart="never" nodeType="tmRoot">
+        <p:cTn xmlns:p14="http://schemas.microsoft.com/office/powerpoint/2010/main" id="1" dur="indefinite" restart="never" nodeType="tmRoot">
           <p:childTnLst>
             <p:seq>
               <p:cTn id="2" nodeType="mainSeq"/>
@@ -4686,7 +4713,7 @@
               </a:rPr>
               <a:t>:</a:t>
             </a:r>
-            <a:endParaRPr sz="2000"/>
+            <a:endParaRPr sz="2000" dirty="0"/>
           </a:p>
           <a:p>
             <a:pPr lvl="1">
@@ -4695,13 +4722,13 @@
               <a:buChar char="•"/>
             </a:pPr>
             <a:r>
-              <a:rPr lang="it-IT" sz="3200" b="1" dirty="0">
+              <a:rPr lang="it-IT" sz="3200" b="1" dirty="0" smtClean="0">
                 <a:solidFill>
                   <a:srgbClr val="000000"/>
                 </a:solidFill>
                 <a:latin typeface="Calibri"/>
               </a:rPr>
-              <a:t>Composizione classe</a:t>
+              <a:t> Composizione classe</a:t>
             </a:r>
             <a:r>
               <a:rPr lang="it-IT" sz="3200" dirty="0">
@@ -4710,7 +4737,7 @@
                 </a:solidFill>
                 <a:latin typeface="Calibri"/>
               </a:rPr>
-              <a:t>, manda una notifica al responsabile delle </a:t>
+              <a:t>:</a:t>
             </a:r>
             <a:r>
               <a:rPr lang="it-IT" sz="3200" dirty="0" smtClean="0">
@@ -4719,7 +4746,34 @@
                 </a:solidFill>
                 <a:latin typeface="Calibri"/>
               </a:rPr>
-              <a:t>classi,che </a:t>
+              <a:t> </a:t>
+            </a:r>
+            <a:r>
+              <a:rPr lang="it-IT" sz="3200" dirty="0">
+                <a:solidFill>
+                  <a:srgbClr val="000000"/>
+                </a:solidFill>
+                <a:latin typeface="Calibri"/>
+              </a:rPr>
+              <a:t>manda una notifica al responsabile delle </a:t>
+            </a:r>
+            <a:r>
+              <a:rPr lang="it-IT" sz="3200" dirty="0" smtClean="0">
+                <a:solidFill>
+                  <a:srgbClr val="000000"/>
+                </a:solidFill>
+                <a:latin typeface="Calibri"/>
+              </a:rPr>
+              <a:t>classi</a:t>
+            </a:r>
+            <a:r>
+              <a:rPr lang="it-IT" sz="3200" dirty="0" smtClean="0">
+                <a:solidFill>
+                  <a:srgbClr val="000000"/>
+                </a:solidFill>
+                <a:latin typeface="Calibri"/>
+              </a:rPr>
+              <a:t>, che </a:t>
             </a:r>
             <a:r>
               <a:rPr lang="it-IT" sz="3200" dirty="0">
@@ -4739,7 +4793,7 @@
               </a:rPr>
               <a:t>dovrà poi approvare.</a:t>
             </a:r>
-            <a:endParaRPr sz="2000"/>
+            <a:endParaRPr sz="2000" dirty="0"/>
           </a:p>
           <a:p>
             <a:pPr lvl="1">
@@ -4748,31 +4802,31 @@
               <a:buChar char="•"/>
             </a:pPr>
             <a:r>
-              <a:rPr lang="it-IT" sz="3200" b="1" dirty="0">
+              <a:rPr lang="it-IT" sz="3200" b="1" dirty="0" smtClean="0">
                 <a:solidFill>
                   <a:srgbClr val="000000"/>
                 </a:solidFill>
                 <a:latin typeface="Calibri"/>
               </a:rPr>
-              <a:t>Evento</a:t>
-            </a:r>
-            <a:r>
-              <a:rPr lang="it-IT" sz="3200" dirty="0">
+              <a:t> Evento</a:t>
+            </a:r>
+            <a:r>
+              <a:rPr lang="it-IT" sz="3200" dirty="0" smtClean="0">
                 <a:solidFill>
                   <a:srgbClr val="000000"/>
                 </a:solidFill>
                 <a:latin typeface="Calibri"/>
               </a:rPr>
-              <a:t>,manda una notifica tutte le </a:t>
-            </a:r>
-            <a:r>
-              <a:rPr lang="it-IT" sz="3200" dirty="0" err="1">
+              <a:t>: </a:t>
+            </a:r>
+            <a:r>
+              <a:rPr lang="it-IT" sz="3200" dirty="0" smtClean="0">
                 <a:solidFill>
                   <a:srgbClr val="000000"/>
                 </a:solidFill>
                 <a:latin typeface="Calibri"/>
               </a:rPr>
-              <a:t>email</a:t>
+              <a:t>manda </a:t>
             </a:r>
             <a:r>
               <a:rPr lang="it-IT" sz="3200" dirty="0">
@@ -4781,9 +4835,9 @@
                 </a:solidFill>
                 <a:latin typeface="Calibri"/>
               </a:rPr>
-              <a:t> presenti nel campo CC dell'evento, con data ora e luogo dell'evento.</a:t>
-            </a:r>
-            <a:endParaRPr sz="2000"/>
+              <a:t>una notifica tutte le email presenti nel campo CC dell'evento, con data ora e luogo dell'evento.</a:t>
+            </a:r>
+            <a:endParaRPr sz="2000" dirty="0"/>
           </a:p>
           <a:p>
             <a:pPr lvl="1">
@@ -4800,7 +4854,7 @@
               </a:rPr>
               <a:t>…..</a:t>
             </a:r>
-            <a:endParaRPr sz="2000"/>
+            <a:endParaRPr sz="2000" dirty="0"/>
           </a:p>
         </p:txBody>
       </p:sp>
@@ -4812,7 +4866,7 @@
   <p:timing>
     <p:tnLst>
       <p:par>
-        <p:cTn id="1" dur="indefinite" restart="never" nodeType="tmRoot">
+        <p:cTn xmlns:p14="http://schemas.microsoft.com/office/powerpoint/2010/main" id="1" dur="indefinite" restart="never" nodeType="tmRoot">
           <p:childTnLst>
             <p:seq>
               <p:cTn id="2" nodeType="mainSeq"/>
@@ -4925,7 +4979,7 @@
               </a:lnSpc>
               <a:buSzPct val="95000"/>
             </a:pPr>
-            <a:endParaRPr sz="3200"/>
+            <a:endParaRPr sz="3200" dirty="0"/>
           </a:p>
           <a:p>
             <a:pPr>
@@ -4937,22 +4991,31 @@
               <a:buChar char="•"/>
             </a:pPr>
             <a:r>
-              <a:rPr lang="it-IT" sz="3200" b="1" dirty="0">
+              <a:rPr lang="it-IT" sz="3200" b="1" dirty="0" smtClean="0">
                 <a:solidFill>
                   <a:srgbClr val="000000"/>
                 </a:solidFill>
                 <a:latin typeface="Calibri"/>
               </a:rPr>
-              <a:t>Licenziamento,</a:t>
-            </a:r>
-            <a:r>
-              <a:rPr lang="it-IT" sz="3200" dirty="0">
+              <a:t> Licenziamento: </a:t>
+            </a:r>
+            <a:r>
+              <a:rPr lang="it-IT" sz="3200" dirty="0" smtClean="0">
                 <a:solidFill>
                   <a:srgbClr val="000000"/>
                 </a:solidFill>
                 <a:latin typeface="Calibri"/>
               </a:rPr>
-              <a:t>manda una notifica al diretto interessato</a:t>
+              <a:t>manda </a:t>
+            </a:r>
+            <a:r>
+              <a:rPr lang="it-IT" sz="3200" dirty="0">
+                <a:solidFill>
+                  <a:srgbClr val="000000"/>
+                </a:solidFill>
+                <a:latin typeface="Calibri"/>
+              </a:rPr>
+              <a:t>una notifica al diretto interessato</a:t>
             </a:r>
             <a:r>
               <a:rPr lang="it-IT" sz="3200" b="1" dirty="0">
@@ -4963,7 +5026,7 @@
               </a:rPr>
               <a:t>.</a:t>
             </a:r>
-            <a:endParaRPr sz="3200"/>
+            <a:endParaRPr sz="3200" dirty="0"/>
           </a:p>
           <a:p>
             <a:pPr>
@@ -4975,45 +5038,49 @@
               <a:buChar char="•"/>
             </a:pPr>
             <a:r>
-              <a:rPr lang="it-IT" sz="3200" b="1" dirty="0">
+              <a:rPr lang="it-IT" sz="3200" b="1" dirty="0" smtClean="0">
                 <a:solidFill>
                   <a:srgbClr val="000000"/>
                 </a:solidFill>
                 <a:latin typeface="Calibri"/>
               </a:rPr>
-              <a:t>Registrazione,</a:t>
-            </a:r>
-            <a:r>
-              <a:rPr lang="it-IT" sz="3200" dirty="0">
+              <a:t> Registrazione: </a:t>
+            </a:r>
+            <a:r>
+              <a:rPr lang="it-IT" sz="3200" dirty="0" smtClean="0">
                 <a:solidFill>
                   <a:srgbClr val="000000"/>
                 </a:solidFill>
                 <a:latin typeface="Calibri"/>
               </a:rPr>
-              <a:t>alla fine della registrazione il sistema invia un </a:t>
-            </a:r>
-            <a:endParaRPr lang="it-IT" sz="3200" dirty="0" smtClean="0">
-              <a:solidFill>
-                <a:srgbClr val="000000"/>
-              </a:solidFill>
-              <a:latin typeface="Calibri"/>
-            </a:endParaRPr>
-          </a:p>
-          <a:p>
-            <a:pPr>
-              <a:lnSpc>
-                <a:spcPct val="100000"/>
-              </a:lnSpc>
-              <a:buSzPct val="95000"/>
-            </a:pPr>
-            <a:r>
-              <a:rPr lang="it-IT" sz="3200" dirty="0" smtClean="0">
+              <a:t>alla </a:t>
+            </a:r>
+            <a:r>
+              <a:rPr lang="it-IT" sz="3200" dirty="0">
                 <a:solidFill>
                   <a:srgbClr val="000000"/>
                 </a:solidFill>
                 <a:latin typeface="Calibri"/>
               </a:rPr>
-              <a:t>e-mail </a:t>
+              <a:t>fine della registrazione il sistema invia </a:t>
+            </a:r>
+            <a:r>
+              <a:rPr lang="it-IT" sz="3200" dirty="0" smtClean="0">
+                <a:solidFill>
+                  <a:srgbClr val="000000"/>
+                </a:solidFill>
+                <a:latin typeface="Calibri"/>
+              </a:rPr>
+              <a:t>una e</a:t>
+            </a:r>
+            <a:r>
+              <a:rPr lang="it-IT" sz="3200" dirty="0" smtClean="0">
+                <a:solidFill>
+                  <a:srgbClr val="000000"/>
+                </a:solidFill>
+                <a:latin typeface="Calibri"/>
+              </a:rPr>
+              <a:t>-mail </a:t>
             </a:r>
             <a:r>
               <a:rPr lang="it-IT" sz="3200" dirty="0">
@@ -5033,7 +5100,7 @@
               </a:rPr>
               <a:t>.</a:t>
             </a:r>
-            <a:endParaRPr sz="3200"/>
+            <a:endParaRPr sz="3200" dirty="0"/>
           </a:p>
         </p:txBody>
       </p:sp>
@@ -5117,7 +5184,7 @@
   <p:timing>
     <p:tnLst>
       <p:par>
-        <p:cTn id="1" dur="indefinite" restart="never" nodeType="tmRoot">
+        <p:cTn xmlns:p14="http://schemas.microsoft.com/office/powerpoint/2010/main" id="1" dur="indefinite" restart="never" nodeType="tmRoot">
           <p:childTnLst>
             <p:seq>
               <p:cTn id="2" nodeType="mainSeq"/>
@@ -5269,7 +5336,7 @@
                 </a:solidFill>
                 <a:latin typeface="Calibri"/>
               </a:rPr>
-              <a:t>Per </a:t>
+              <a:t> Per </a:t>
             </a:r>
             <a:r>
               <a:rPr lang="it-IT" sz="3200" dirty="0">
@@ -5305,34 +5372,16 @@
                 </a:solidFill>
                 <a:latin typeface="Calibri"/>
               </a:rPr>
-              <a:t>JAVAMAIL  (</a:t>
-            </a:r>
-            <a:r>
-              <a:rPr lang="it-IT" sz="3200" b="1" dirty="0">
+              <a:t>JAVAMAIL  </a:t>
+            </a:r>
+            <a:r>
+              <a:rPr lang="it-IT" sz="3200" b="1" dirty="0" smtClean="0">
                 <a:solidFill>
                   <a:srgbClr val="000000"/>
                 </a:solidFill>
                 <a:latin typeface="Calibri"/>
               </a:rPr>
-              <a:t>è </a:t>
-            </a:r>
-            <a:r>
-              <a:rPr lang="it-IT" sz="3200" b="1" dirty="0" smtClean="0">
-                <a:solidFill>
-                  <a:srgbClr val="000000"/>
-                </a:solidFill>
-                <a:latin typeface="Calibri"/>
-              </a:rPr>
-              <a:t>un </a:t>
-            </a:r>
-            <a:r>
-              <a:rPr lang="it-IT" sz="3200" b="1" dirty="0">
-                <a:solidFill>
-                  <a:srgbClr val="000000"/>
-                </a:solidFill>
-                <a:latin typeface="Calibri"/>
-              </a:rPr>
-              <a:t>api della </a:t>
+              <a:t>(API di </a:t>
             </a:r>
             <a:r>
               <a:rPr lang="it-IT" sz="3200" b="1" dirty="0" err="1">
@@ -5397,7 +5446,7 @@
               </a:rPr>
               <a:t>il design pattern BRIDGE.</a:t>
             </a:r>
-            <a:endParaRPr sz="2000"/>
+            <a:endParaRPr sz="2000" dirty="0"/>
           </a:p>
         </p:txBody>
       </p:sp>
@@ -5446,7 +5495,7 @@
   <p:timing>
     <p:tnLst>
       <p:par>
-        <p:cTn id="1" dur="indefinite" restart="never" nodeType="tmRoot">
+        <p:cTn xmlns:p14="http://schemas.microsoft.com/office/powerpoint/2010/main" id="1" dur="indefinite" restart="never" nodeType="tmRoot">
           <p:childTnLst>
             <p:seq>
               <p:cTn id="2" nodeType="mainSeq"/>
@@ -5686,7 +5735,7 @@
   <p:timing>
     <p:tnLst>
       <p:par>
-        <p:cTn id="1" dur="indefinite" restart="never" nodeType="tmRoot">
+        <p:cTn xmlns:p14="http://schemas.microsoft.com/office/powerpoint/2010/main" id="1" dur="indefinite" restart="never" nodeType="tmRoot">
           <p:childTnLst>
             <p:seq>
               <p:cTn id="2" nodeType="mainSeq"/>
@@ -5936,7 +5985,7 @@
   <p:timing>
     <p:tnLst>
       <p:par>
-        <p:cTn id="1" dur="indefinite" restart="never" nodeType="tmRoot">
+        <p:cTn xmlns:p14="http://schemas.microsoft.com/office/powerpoint/2010/main" id="1" dur="indefinite" restart="never" nodeType="tmRoot">
           <p:childTnLst>
             <p:seq>
               <p:cTn id="2" nodeType="mainSeq"/>
@@ -6200,22 +6249,30 @@
               <a:t> A </a:t>
             </a:r>
             <a:r>
+              <a:rPr lang="it-IT" dirty="0" smtClean="0"/>
+              <a:t>e B </a:t>
+            </a:r>
+            <a:r>
+              <a:rPr lang="it-IT" dirty="0" smtClean="0"/>
+              <a:t>corrispondono i vari </a:t>
+            </a:r>
+          </a:p>
+          <a:p>
+            <a:r>
+              <a:rPr lang="it-IT" dirty="0" smtClean="0"/>
+              <a:t>tipi di messaggi sopra </a:t>
+            </a:r>
+            <a:r>
+              <a:rPr lang="it-IT" dirty="0" smtClean="0"/>
+              <a:t>citati, </a:t>
+            </a:r>
+            <a:r>
+              <a:rPr lang="it-IT" dirty="0" smtClean="0"/>
+              <a:t>ovvero : </a:t>
+            </a:r>
+            <a:r>
               <a:rPr lang="it-IT" dirty="0" err="1" smtClean="0"/>
-              <a:t>eB</a:t>
-            </a:r>
-            <a:r>
-              <a:rPr lang="it-IT" dirty="0" smtClean="0"/>
-              <a:t> corrispondono i vari </a:t>
-            </a:r>
-          </a:p>
-          <a:p>
-            <a:r>
-              <a:rPr lang="it-IT" dirty="0" smtClean="0"/>
-              <a:t>tipi di messaggi sopra citati ovvero : </a:t>
-            </a:r>
-            <a:r>
-              <a:rPr lang="it-IT" dirty="0" err="1" smtClean="0"/>
-              <a:t>ComposioneClasse</a:t>
+              <a:t>ComposizioneClasse</a:t>
             </a:r>
             <a:r>
               <a:rPr lang="it-IT" dirty="0" smtClean="0"/>
@@ -6239,7 +6296,7 @@
   <p:timing>
     <p:tnLst>
       <p:par>
-        <p:cTn id="1" dur="indefinite" restart="never" nodeType="tmRoot">
+        <p:cTn xmlns:p14="http://schemas.microsoft.com/office/powerpoint/2010/main" id="1" dur="indefinite" restart="never" nodeType="tmRoot">
           <p:childTnLst>
             <p:seq>
               <p:cTn id="2" nodeType="mainSeq"/>
@@ -6366,8 +6423,8 @@
               <a:buChar char="v"/>
             </a:pPr>
             <a:r>
-              <a:rPr lang="it-IT" sz="3200" b="1" dirty="0" err="1" smtClean="0"/>
-              <a:t>Perchè</a:t>
+              <a:rPr lang="it-IT" sz="3200" b="1" dirty="0" smtClean="0"/>
+              <a:t>Perché</a:t>
             </a:r>
             <a:endParaRPr lang="it-IT" sz="3200" dirty="0" smtClean="0"/>
           </a:p>
@@ -6388,11 +6445,19 @@
             </a:pPr>
             <a:r>
               <a:rPr lang="it-IT" sz="2800" dirty="0" smtClean="0"/>
-              <a:t>ci permette di inserire altri messaggi in modo semplice  e senza causare molti cambiamenti nel sistema cosi come modificare quelli già esistenti</a:t>
+              <a:t> ci </a:t>
             </a:r>
             <a:r>
               <a:rPr lang="it-IT" sz="2800" dirty="0" smtClean="0"/>
-              <a:t>.</a:t>
+              <a:t>permette di inserire altri messaggi in modo semplice  e senza causare molti cambiamenti nel </a:t>
+            </a:r>
+            <a:r>
+              <a:rPr lang="it-IT" sz="2800" dirty="0" smtClean="0"/>
+              <a:t>sistema, così </a:t>
+            </a:r>
+            <a:r>
+              <a:rPr lang="it-IT" sz="2800" dirty="0" smtClean="0"/>
+              <a:t>come modificare quelli già esistenti.</a:t>
             </a:r>
           </a:p>
         </p:txBody>
@@ -6428,16 +6493,7 @@
                 </a:solidFill>
                 <a:latin typeface="Calibri"/>
               </a:rPr>
-              <a:t>PERCHE’ BRIDGE</a:t>
-            </a:r>
-            <a:r>
-              <a:rPr lang="it-IT" sz="4800" b="1" dirty="0" smtClean="0">
-                <a:solidFill>
-                  <a:srgbClr val="000000"/>
-                </a:solidFill>
-                <a:latin typeface="Calibri"/>
-              </a:rPr>
-              <a:t>?</a:t>
+              <a:t>PERCHE’ BRIDGE?</a:t>
             </a:r>
           </a:p>
           <a:p>
@@ -6467,7 +6523,7 @@
   <p:timing>
     <p:tnLst>
       <p:par>
-        <p:cTn id="1" dur="indefinite" restart="never" nodeType="tmRoot">
+        <p:cTn xmlns:p14="http://schemas.microsoft.com/office/powerpoint/2010/main" id="1" dur="indefinite" restart="never" nodeType="tmRoot">
           <p:childTnLst>
             <p:seq>
               <p:cTn id="2" nodeType="mainSeq"/>
@@ -6599,15 +6655,6 @@
             </a:r>
           </a:p>
           <a:p>
-            <a:pPr>
-              <a:lnSpc>
-                <a:spcPct val="100000"/>
-              </a:lnSpc>
-              <a:buSzPct val="95000"/>
-            </a:pPr>
-            <a:endParaRPr lang="it-IT" sz="3200" b="1" dirty="0" smtClean="0"/>
-          </a:p>
-          <a:p>
             <a:pPr lvl="1">
               <a:buSzPct val="95000"/>
             </a:pPr>
@@ -6621,7 +6668,7 @@
             </a:pPr>
             <a:r>
               <a:rPr lang="it-IT" sz="2800" dirty="0" smtClean="0"/>
-              <a:t>il </a:t>
+              <a:t> il </a:t>
             </a:r>
             <a:r>
               <a:rPr lang="it-IT" sz="2800" dirty="0" err="1" smtClean="0"/>
@@ -6629,13 +6676,17 @@
             </a:r>
             <a:r>
               <a:rPr lang="it-IT" sz="2800" dirty="0" smtClean="0"/>
-              <a:t> </a:t>
+              <a:t> può usare un solo metodo di invio senza badare al tipo di </a:t>
             </a:r>
             <a:r>
               <a:rPr lang="it-IT" sz="2800" dirty="0" smtClean="0"/>
-              <a:t>può usare un solo metodo di invio senza badare al tipo di notifica infatti prende in input un oggetto MESSAGGIO.</a:t>
-            </a:r>
-            <a:endParaRPr sz="2800"/>
+              <a:t>notifica, </a:t>
+            </a:r>
+            <a:r>
+              <a:rPr lang="it-IT" sz="2800" dirty="0" smtClean="0"/>
+              <a:t>infatti prende in input un oggetto MESSAGGIO.</a:t>
+            </a:r>
+            <a:endParaRPr sz="2800" dirty="0"/>
           </a:p>
         </p:txBody>
       </p:sp>
@@ -6670,16 +6721,7 @@
                 </a:solidFill>
                 <a:latin typeface="Calibri"/>
               </a:rPr>
-              <a:t>PERCHE’ BRIDGE</a:t>
-            </a:r>
-            <a:r>
-              <a:rPr lang="it-IT" sz="4800" b="1" dirty="0" smtClean="0">
-                <a:solidFill>
-                  <a:srgbClr val="000000"/>
-                </a:solidFill>
-                <a:latin typeface="Calibri"/>
-              </a:rPr>
-              <a:t>?</a:t>
+              <a:t>PERCHE’ BRIDGE?</a:t>
             </a:r>
           </a:p>
           <a:p>
@@ -6709,7 +6751,7 @@
   <p:timing>
     <p:tnLst>
       <p:par>
-        <p:cTn id="1" dur="indefinite" restart="never" nodeType="tmRoot">
+        <p:cTn xmlns:p14="http://schemas.microsoft.com/office/powerpoint/2010/main" id="1" dur="indefinite" restart="never" nodeType="tmRoot">
           <p:childTnLst>
             <p:seq>
               <p:cTn id="2" nodeType="mainSeq"/>

</xml_diff>